<commit_message>
updates instructions and pptx
</commit_message>
<xml_diff>
--- a/git-github_2025.pptx
+++ b/git-github_2025.pptx
@@ -16,6 +16,8 @@
     <p:sldId id="263" r:id="rId10"/>
     <p:sldId id="266" r:id="rId11"/>
     <p:sldId id="267" r:id="rId12"/>
+    <p:sldId id="268" r:id="rId13"/>
+    <p:sldId id="269" r:id="rId14"/>
   </p:sldIdLst>
   <p:sldSz cx="12192000" cy="6858000"/>
   <p:notesSz cx="6858000" cy="9144000"/>
@@ -120,14 +122,6 @@
     </p:ext>
   </p:extLst>
 </p:presentation>
-</file>
-
-<file path=ppt/revisionInfo.xml><?xml version="1.0" encoding="utf-8"?>
-<p1510:revInfo xmlns:a="http://schemas.openxmlformats.org/drawingml/2006/main" xmlns:r="http://schemas.openxmlformats.org/officeDocument/2006/relationships" xmlns:p1510="http://schemas.microsoft.com/office/powerpoint/2015/10/main">
-  <p1510:revLst>
-    <p1510:client id="{58ACB70D-CE24-D4D1-D030-42814404DDAA}" v="2415" dt="2025-11-21T14:10:56.720"/>
-  </p1510:revLst>
-</p1510:revInfo>
 </file>
 
 <file path=ppt/slideLayouts/slideLayout1.xml><?xml version="1.0" encoding="utf-8"?>
@@ -4724,6 +4718,897 @@
 </p:sld>
 </file>
 
+<file path=ppt/slides/slide12.xml><?xml version="1.0" encoding="utf-8"?>
+<p:sld xmlns:a="http://schemas.openxmlformats.org/drawingml/2006/main" xmlns:r="http://schemas.openxmlformats.org/officeDocument/2006/relationships" xmlns:p="http://schemas.openxmlformats.org/presentationml/2006/main">
+  <p:cSld>
+    <p:bg>
+      <p:bgPr>
+        <a:solidFill>
+          <a:srgbClr val="F9F0DB"/>
+        </a:solidFill>
+        <a:effectLst/>
+      </p:bgPr>
+    </p:bg>
+    <p:spTree>
+      <p:nvGrpSpPr>
+        <p:cNvPr id="1" name="">
+          <a:extLst>
+            <a:ext uri="{FF2B5EF4-FFF2-40B4-BE49-F238E27FC236}">
+              <a16:creationId xmlns:a16="http://schemas.microsoft.com/office/drawing/2014/main" id="{251B08CF-372A-068F-CAEE-7C3D2E717143}"/>
+            </a:ext>
+          </a:extLst>
+        </p:cNvPr>
+        <p:cNvGrpSpPr/>
+        <p:nvPr/>
+      </p:nvGrpSpPr>
+      <p:grpSpPr>
+        <a:xfrm>
+          <a:off x="0" y="0"/>
+          <a:ext cx="0" cy="0"/>
+          <a:chOff x="0" y="0"/>
+          <a:chExt cx="0" cy="0"/>
+        </a:xfrm>
+      </p:grpSpPr>
+      <p:sp>
+        <p:nvSpPr>
+          <p:cNvPr id="10" name="TextBox 7">
+            <a:extLst>
+              <a:ext uri="{FF2B5EF4-FFF2-40B4-BE49-F238E27FC236}">
+                <a16:creationId xmlns:a16="http://schemas.microsoft.com/office/drawing/2014/main" id="{6DEC832A-5926-2C44-1348-C26E3FE0A372}"/>
+              </a:ext>
+            </a:extLst>
+          </p:cNvPr>
+          <p:cNvSpPr txBox="1"/>
+          <p:nvPr/>
+        </p:nvSpPr>
+        <p:spPr>
+          <a:xfrm>
+            <a:off x="1317" y="133326"/>
+            <a:ext cx="4443563" cy="492443"/>
+          </a:xfrm>
+          <a:prstGeom prst="rect">
+            <a:avLst/>
+          </a:prstGeom>
+        </p:spPr>
+        <p:txBody>
+          <a:bodyPr wrap="square" lIns="0" tIns="0" rIns="0" bIns="0" rtlCol="0" anchor="t">
+            <a:spAutoFit/>
+          </a:bodyPr>
+          <a:lstStyle>
+            <a:defPPr>
+              <a:defRPr lang="en-US"/>
+            </a:defPPr>
+            <a:lvl1pPr marL="0" algn="l" defTabSz="1792956" rtl="0" eaLnBrk="1" latinLnBrk="0" hangingPunct="1">
+              <a:defRPr sz="3529" kern="1200">
+                <a:solidFill>
+                  <a:schemeClr val="tx1"/>
+                </a:solidFill>
+                <a:latin typeface="+mn-lt"/>
+                <a:ea typeface="+mn-ea"/>
+                <a:cs typeface="+mn-cs"/>
+              </a:defRPr>
+            </a:lvl1pPr>
+            <a:lvl2pPr marL="896478" algn="l" defTabSz="1792956" rtl="0" eaLnBrk="1" latinLnBrk="0" hangingPunct="1">
+              <a:defRPr sz="3529" kern="1200">
+                <a:solidFill>
+                  <a:schemeClr val="tx1"/>
+                </a:solidFill>
+                <a:latin typeface="+mn-lt"/>
+                <a:ea typeface="+mn-ea"/>
+                <a:cs typeface="+mn-cs"/>
+              </a:defRPr>
+            </a:lvl2pPr>
+            <a:lvl3pPr marL="1792956" algn="l" defTabSz="1792956" rtl="0" eaLnBrk="1" latinLnBrk="0" hangingPunct="1">
+              <a:defRPr sz="3529" kern="1200">
+                <a:solidFill>
+                  <a:schemeClr val="tx1"/>
+                </a:solidFill>
+                <a:latin typeface="+mn-lt"/>
+                <a:ea typeface="+mn-ea"/>
+                <a:cs typeface="+mn-cs"/>
+              </a:defRPr>
+            </a:lvl3pPr>
+            <a:lvl4pPr marL="2689433" algn="l" defTabSz="1792956" rtl="0" eaLnBrk="1" latinLnBrk="0" hangingPunct="1">
+              <a:defRPr sz="3529" kern="1200">
+                <a:solidFill>
+                  <a:schemeClr val="tx1"/>
+                </a:solidFill>
+                <a:latin typeface="+mn-lt"/>
+                <a:ea typeface="+mn-ea"/>
+                <a:cs typeface="+mn-cs"/>
+              </a:defRPr>
+            </a:lvl4pPr>
+            <a:lvl5pPr marL="3585911" algn="l" defTabSz="1792956" rtl="0" eaLnBrk="1" latinLnBrk="0" hangingPunct="1">
+              <a:defRPr sz="3529" kern="1200">
+                <a:solidFill>
+                  <a:schemeClr val="tx1"/>
+                </a:solidFill>
+                <a:latin typeface="+mn-lt"/>
+                <a:ea typeface="+mn-ea"/>
+                <a:cs typeface="+mn-cs"/>
+              </a:defRPr>
+            </a:lvl5pPr>
+            <a:lvl6pPr marL="4482389" algn="l" defTabSz="1792956" rtl="0" eaLnBrk="1" latinLnBrk="0" hangingPunct="1">
+              <a:defRPr sz="3529" kern="1200">
+                <a:solidFill>
+                  <a:schemeClr val="tx1"/>
+                </a:solidFill>
+                <a:latin typeface="+mn-lt"/>
+                <a:ea typeface="+mn-ea"/>
+                <a:cs typeface="+mn-cs"/>
+              </a:defRPr>
+            </a:lvl6pPr>
+            <a:lvl7pPr marL="5378867" algn="l" defTabSz="1792956" rtl="0" eaLnBrk="1" latinLnBrk="0" hangingPunct="1">
+              <a:defRPr sz="3529" kern="1200">
+                <a:solidFill>
+                  <a:schemeClr val="tx1"/>
+                </a:solidFill>
+                <a:latin typeface="+mn-lt"/>
+                <a:ea typeface="+mn-ea"/>
+                <a:cs typeface="+mn-cs"/>
+              </a:defRPr>
+            </a:lvl7pPr>
+            <a:lvl8pPr marL="6275344" algn="l" defTabSz="1792956" rtl="0" eaLnBrk="1" latinLnBrk="0" hangingPunct="1">
+              <a:defRPr sz="3529" kern="1200">
+                <a:solidFill>
+                  <a:schemeClr val="tx1"/>
+                </a:solidFill>
+                <a:latin typeface="+mn-lt"/>
+                <a:ea typeface="+mn-ea"/>
+                <a:cs typeface="+mn-cs"/>
+              </a:defRPr>
+            </a:lvl8pPr>
+            <a:lvl9pPr marL="7171822" algn="l" defTabSz="1792956" rtl="0" eaLnBrk="1" latinLnBrk="0" hangingPunct="1">
+              <a:defRPr sz="3529" kern="1200">
+                <a:solidFill>
+                  <a:schemeClr val="tx1"/>
+                </a:solidFill>
+                <a:latin typeface="+mn-lt"/>
+                <a:ea typeface="+mn-ea"/>
+                <a:cs typeface="+mn-cs"/>
+              </a:defRPr>
+            </a:lvl9pPr>
+          </a:lstStyle>
+          <a:p>
+            <a:pPr algn="ctr"/>
+            <a:r>
+              <a:rPr lang="en-US" sz="1600" b="1" dirty="0">
+                <a:solidFill>
+                  <a:srgbClr val="00356B"/>
+                </a:solidFill>
+                <a:latin typeface="Yale"/>
+                <a:ea typeface="Agrandir Narrow Bold"/>
+                <a:cs typeface="Agrandir Narrow Bold"/>
+                <a:sym typeface="Agrandir Narrow Bold"/>
+              </a:rPr>
+              <a:t>Yale SCHOOL OF THE ENVIRONMENT</a:t>
+            </a:r>
+          </a:p>
+          <a:p>
+            <a:r>
+              <a:rPr lang="en-US" sz="1600" b="1" i="1" dirty="0">
+                <a:solidFill>
+                  <a:srgbClr val="00356B"/>
+                </a:solidFill>
+                <a:latin typeface="Yale"/>
+                <a:ea typeface="Agrandir Narrow Bold"/>
+                <a:cs typeface="Agrandir Narrow Bold"/>
+                <a:sym typeface="Agrandir Narrow Bold"/>
+              </a:rPr>
+              <a:t>          </a:t>
+            </a:r>
+            <a:r>
+              <a:rPr lang="en-US" sz="1600" i="1" dirty="0">
+                <a:solidFill>
+                  <a:srgbClr val="00356B"/>
+                </a:solidFill>
+                <a:latin typeface="Yale"/>
+                <a:ea typeface="Agrandir Narrow Bold"/>
+                <a:cs typeface="Agrandir Narrow Bold"/>
+                <a:sym typeface="Agrandir Narrow Bold"/>
+              </a:rPr>
+              <a:t>Research Computing</a:t>
+            </a:r>
+          </a:p>
+        </p:txBody>
+      </p:sp>
+      <p:pic>
+        <p:nvPicPr>
+          <p:cNvPr id="13" name="Picture 12">
+            <a:extLst>
+              <a:ext uri="{FF2B5EF4-FFF2-40B4-BE49-F238E27FC236}">
+                <a16:creationId xmlns:a16="http://schemas.microsoft.com/office/drawing/2014/main" id="{706BE000-A4AF-E0C7-337D-E58FA9F219F8}"/>
+              </a:ext>
+            </a:extLst>
+          </p:cNvPr>
+          <p:cNvPicPr>
+            <a:picLocks noChangeAspect="1"/>
+          </p:cNvPicPr>
+          <p:nvPr/>
+        </p:nvPicPr>
+        <p:blipFill>
+          <a:blip r:embed="rId2">
+            <a:extLst>
+              <a:ext uri="{BEBA8EAE-BF5A-486C-A8C5-ECC9F3942E4B}">
+                <a14:imgProps xmlns:a14="http://schemas.microsoft.com/office/drawing/2010/main">
+                  <a14:imgLayer r:embed="rId3">
+                    <a14:imgEffect>
+                      <a14:backgroundRemoval t="1743" b="98039" l="1654" r="98092">
+                        <a14:foregroundMark x1="22010" y1="7734" x2="27226" y2="9695"/>
+                        <a14:foregroundMark x1="4580" y1="3050" x2="16158" y2="6100"/>
+                        <a14:foregroundMark x1="16285" y1="46950" x2="23791" y2="61765"/>
+                        <a14:foregroundMark x1="81679" y1="51961" x2="79771" y2="60240"/>
+                        <a14:foregroundMark x1="90204" y1="28214" x2="96056" y2="30065"/>
+                        <a14:foregroundMark x1="94275" y1="2614" x2="96947" y2="2941"/>
+                        <a14:foregroundMark x1="82570" y1="1743" x2="82570" y2="1743"/>
+                        <a14:foregroundMark x1="98092" y1="37255" x2="98092" y2="37255"/>
+                        <a14:foregroundMark x1="58524" y1="93682" x2="58524" y2="93682"/>
+                        <a14:foregroundMark x1="50127" y1="98148" x2="50127" y2="98148"/>
+                        <a14:foregroundMark x1="29008" y1="87691" x2="29008" y2="87691"/>
+                        <a14:foregroundMark x1="7888" y1="63508" x2="8142" y2="65251"/>
+                        <a14:foregroundMark x1="1654" y1="29085" x2="1654" y2="29085"/>
+                        <a14:foregroundMark x1="2036" y1="26580" x2="2036" y2="26580"/>
+                        <a14:foregroundMark x1="5852" y1="60022" x2="5852" y2="60022"/>
+                        <a14:foregroundMark x1="16285" y1="76144" x2="16285" y2="76144"/>
+                        <a14:foregroundMark x1="1654" y1="38562" x2="1654" y2="38562"/>
+                        <a14:foregroundMark x1="2417" y1="49564" x2="2417" y2="49564"/>
+                        <a14:foregroundMark x1="2926" y1="50000" x2="2926" y2="50000"/>
+                        <a14:foregroundMark x1="3944" y1="54031" x2="3944" y2="54031"/>
+                        <a14:foregroundMark x1="1908" y1="35839" x2="1908" y2="35839"/>
+                        <a14:foregroundMark x1="59033" y1="28214" x2="59033" y2="28214"/>
+                        <a14:foregroundMark x1="50254" y1="25817" x2="50254" y2="25817"/>
+                        <a14:foregroundMark x1="41476" y1="27451" x2="41349" y2="27560"/>
+                        <a14:foregroundMark x1="42621" y1="25708" x2="42621" y2="25708"/>
+                        <a14:foregroundMark x1="41094" y1="24619" x2="41094" y2="24619"/>
+                        <a14:foregroundMark x1="39440" y1="25817" x2="39440" y2="25817"/>
+                        <a14:foregroundMark x1="48346" y1="23203" x2="48346" y2="23203"/>
+                        <a14:foregroundMark x1="49746" y1="21895" x2="49746" y2="21895"/>
+                        <a14:foregroundMark x1="51399" y1="23094" x2="51399" y2="23094"/>
+                        <a14:foregroundMark x1="57506" y1="25599" x2="57506" y2="25599"/>
+                        <a14:foregroundMark x1="58524" y1="24510" x2="58524" y2="24510"/>
+                        <a14:foregroundMark x1="60051" y1="25272" x2="60051" y2="25272"/>
+                        <a14:foregroundMark x1="77735" y1="17538" x2="77735" y2="17538"/>
+                        <a14:foregroundMark x1="76463" y1="14924" x2="76463" y2="14924"/>
+                        <a14:foregroundMark x1="78117" y1="13834" x2="78117" y2="13834"/>
+                        <a14:foregroundMark x1="79644" y1="15033" x2="79644" y2="15033"/>
+                        <a14:foregroundMark x1="91094" y1="13834" x2="91094" y2="13834"/>
+                        <a14:foregroundMark x1="91985" y1="18192" x2="91985" y2="18192"/>
+                        <a14:foregroundMark x1="90331" y1="19390" x2="90331" y2="19390"/>
+                        <a14:foregroundMark x1="92112" y1="21242" x2="92112" y2="21242"/>
+                        <a14:foregroundMark x1="93639" y1="19390" x2="93511" y2="19390"/>
+                        <a14:foregroundMark x1="97583" y1="20044" x2="97583" y2="20044"/>
+                        <a14:foregroundMark x1="97710" y1="48475" x2="97710" y2="48475"/>
+                        <a14:foregroundMark x1="80407" y1="79194" x2="80407" y2="79194"/>
+                        <a14:foregroundMark x1="89567" y1="68519" x2="89567" y2="68519"/>
+                        <a14:foregroundMark x1="93766" y1="60566" x2="93766" y2="60566"/>
+                        <a14:foregroundMark x1="96056" y1="55338" x2="96056" y2="55338"/>
+                        <a14:foregroundMark x1="40712" y1="7298" x2="40712" y2="7298"/>
+                        <a14:foregroundMark x1="21883" y1="17538" x2="21883" y2="17538"/>
+                        <a14:foregroundMark x1="7634" y1="22004" x2="7634" y2="22004"/>
+                        <a14:foregroundMark x1="9542" y1="13399" x2="9542" y2="13399"/>
+                        <a14:foregroundMark x1="49364" y1="10022" x2="49364" y2="10022"/>
+                        <a14:foregroundMark x1="58651" y1="7190" x2="58651" y2="7190"/>
+                        <a14:foregroundMark x1="57379" y1="4575" x2="57379" y2="4575"/>
+                        <a14:foregroundMark x1="58779" y1="3486" x2="58779" y2="3486"/>
+                        <a14:foregroundMark x1="60433" y1="4684" x2="60433" y2="4684"/>
+                        <a14:foregroundMark x1="49873" y1="6209" x2="49873" y2="6209"/>
+                        <a14:foregroundMark x1="51145" y1="7081" x2="51145" y2="7081"/>
+                        <a14:foregroundMark x1="48473" y1="7081" x2="48473" y2="7081"/>
+                        <a14:foregroundMark x1="40712" y1="3268" x2="40712" y2="3268"/>
+                        <a14:foregroundMark x1="42112" y1="4575" x2="42112" y2="4575"/>
+                        <a14:foregroundMark x1="39313" y1="4575" x2="39313" y2="4575"/>
+                        <a14:foregroundMark x1="21501" y1="13943" x2="21501" y2="13943"/>
+                        <a14:foregroundMark x1="20102" y1="15142" x2="20102" y2="15142"/>
+                        <a14:foregroundMark x1="23155" y1="14815" x2="23155" y2="14815"/>
+                        <a14:foregroundMark x1="8906" y1="9586" x2="8906" y2="9586"/>
+                        <a14:foregroundMark x1="10814" y1="10784" x2="10814" y2="10784"/>
+                        <a14:foregroundMark x1="7888" y1="10675" x2="7888" y2="10675"/>
+                        <a14:foregroundMark x1="7634" y1="18301" x2="7634" y2="18301"/>
+                        <a14:foregroundMark x1="9415" y1="19499" x2="9415" y2="19499"/>
+                        <a14:foregroundMark x1="6489" y1="19390" x2="6489" y2="19390"/>
+                      </a14:backgroundRemoval>
+                    </a14:imgEffect>
+                  </a14:imgLayer>
+                </a14:imgProps>
+              </a:ext>
+            </a:extLst>
+          </a:blip>
+          <a:stretch>
+            <a:fillRect/>
+          </a:stretch>
+        </p:blipFill>
+        <p:spPr>
+          <a:xfrm>
+            <a:off x="11337235" y="41386"/>
+            <a:ext cx="764529" cy="892924"/>
+          </a:xfrm>
+          <a:prstGeom prst="rect">
+            <a:avLst/>
+          </a:prstGeom>
+        </p:spPr>
+      </p:pic>
+      <p:sp>
+        <p:nvSpPr>
+          <p:cNvPr id="2" name="TextBox 1">
+            <a:extLst>
+              <a:ext uri="{FF2B5EF4-FFF2-40B4-BE49-F238E27FC236}">
+                <a16:creationId xmlns:a16="http://schemas.microsoft.com/office/drawing/2014/main" id="{24E6B289-BB88-A170-0E81-1BBE498CB194}"/>
+              </a:ext>
+            </a:extLst>
+          </p:cNvPr>
+          <p:cNvSpPr txBox="1"/>
+          <p:nvPr/>
+        </p:nvSpPr>
+        <p:spPr>
+          <a:xfrm>
+            <a:off x="491240" y="1606338"/>
+            <a:ext cx="10926415" cy="369332"/>
+          </a:xfrm>
+          <a:prstGeom prst="rect">
+            <a:avLst/>
+          </a:prstGeom>
+          <a:noFill/>
+        </p:spPr>
+        <p:txBody>
+          <a:bodyPr rot="0" spcFirstLastPara="0" vertOverflow="overflow" horzOverflow="overflow" vert="horz" wrap="square" lIns="91440" tIns="45720" rIns="91440" bIns="45720" numCol="1" spcCol="0" rtlCol="0" fromWordArt="0" anchor="t" anchorCtr="0" forceAA="0" compatLnSpc="1">
+            <a:prstTxWarp prst="textNoShape">
+              <a:avLst/>
+            </a:prstTxWarp>
+            <a:spAutoFit/>
+          </a:bodyPr>
+          <a:lstStyle/>
+          <a:p>
+            <a:r>
+              <a:rPr lang="en-US" b="1" dirty="0">
+                <a:latin typeface="Microsoft Sans Serif"/>
+                <a:ea typeface="Microsoft Sans Serif"/>
+                <a:cs typeface="Microsoft Sans Serif"/>
+              </a:rPr>
+              <a:t> </a:t>
+            </a:r>
+            <a:endParaRPr lang="en-US" dirty="0">
+              <a:latin typeface="Microsoft Sans Serif"/>
+              <a:ea typeface="Microsoft Sans Serif"/>
+              <a:cs typeface="Microsoft Sans Serif"/>
+            </a:endParaRPr>
+          </a:p>
+        </p:txBody>
+      </p:sp>
+      <p:sp>
+        <p:nvSpPr>
+          <p:cNvPr id="9" name="TextBox 8">
+            <a:extLst>
+              <a:ext uri="{FF2B5EF4-FFF2-40B4-BE49-F238E27FC236}">
+                <a16:creationId xmlns:a16="http://schemas.microsoft.com/office/drawing/2014/main" id="{523DC776-7DAE-748E-1C16-AB3157054346}"/>
+              </a:ext>
+            </a:extLst>
+          </p:cNvPr>
+          <p:cNvSpPr txBox="1"/>
+          <p:nvPr/>
+        </p:nvSpPr>
+        <p:spPr>
+          <a:xfrm>
+            <a:off x="320068" y="1081773"/>
+            <a:ext cx="7784545" cy="523220"/>
+          </a:xfrm>
+          <a:prstGeom prst="rect">
+            <a:avLst/>
+          </a:prstGeom>
+          <a:noFill/>
+        </p:spPr>
+        <p:txBody>
+          <a:bodyPr rot="0" spcFirstLastPara="0" vertOverflow="overflow" horzOverflow="overflow" vert="horz" wrap="square" lIns="91440" tIns="45720" rIns="91440" bIns="45720" numCol="1" spcCol="0" rtlCol="0" fromWordArt="0" anchor="t" anchorCtr="0" forceAA="0" compatLnSpc="1">
+            <a:prstTxWarp prst="textNoShape">
+              <a:avLst/>
+            </a:prstTxWarp>
+            <a:spAutoFit/>
+          </a:bodyPr>
+          <a:lstStyle/>
+          <a:p>
+            <a:r>
+              <a:rPr lang="en-US" sz="2800" u="sng" dirty="0">
+                <a:latin typeface="Microsoft Sans Serif"/>
+                <a:ea typeface="Microsoft Sans Serif"/>
+                <a:cs typeface="Microsoft Sans Serif"/>
+              </a:rPr>
+              <a:t>Step 11.</a:t>
+            </a:r>
+            <a:endParaRPr lang="en-US" dirty="0"/>
+          </a:p>
+        </p:txBody>
+      </p:sp>
+      <p:pic>
+        <p:nvPicPr>
+          <p:cNvPr id="5" name="Picture 4">
+            <a:extLst>
+              <a:ext uri="{FF2B5EF4-FFF2-40B4-BE49-F238E27FC236}">
+                <a16:creationId xmlns:a16="http://schemas.microsoft.com/office/drawing/2014/main" id="{B4A3910A-5E04-9E25-502F-A51F884B8385}"/>
+              </a:ext>
+            </a:extLst>
+          </p:cNvPr>
+          <p:cNvPicPr>
+            <a:picLocks noChangeAspect="1"/>
+          </p:cNvPicPr>
+          <p:nvPr/>
+        </p:nvPicPr>
+        <p:blipFill>
+          <a:blip r:embed="rId4"/>
+          <a:srcRect t="21974"/>
+          <a:stretch>
+            <a:fillRect/>
+          </a:stretch>
+        </p:blipFill>
+        <p:spPr>
+          <a:xfrm>
+            <a:off x="2528558" y="1791004"/>
+            <a:ext cx="6713755" cy="3753463"/>
+          </a:xfrm>
+          <a:prstGeom prst="rect">
+            <a:avLst/>
+          </a:prstGeom>
+        </p:spPr>
+      </p:pic>
+    </p:spTree>
+    <p:extLst>
+      <p:ext uri="{BB962C8B-B14F-4D97-AF65-F5344CB8AC3E}">
+        <p14:creationId xmlns:p14="http://schemas.microsoft.com/office/powerpoint/2010/main" val="1716119539"/>
+      </p:ext>
+    </p:extLst>
+  </p:cSld>
+  <p:clrMapOvr>
+    <a:masterClrMapping/>
+  </p:clrMapOvr>
+</p:sld>
+</file>
+
+<file path=ppt/slides/slide13.xml><?xml version="1.0" encoding="utf-8"?>
+<p:sld xmlns:a="http://schemas.openxmlformats.org/drawingml/2006/main" xmlns:r="http://schemas.openxmlformats.org/officeDocument/2006/relationships" xmlns:p="http://schemas.openxmlformats.org/presentationml/2006/main">
+  <p:cSld>
+    <p:bg>
+      <p:bgPr>
+        <a:solidFill>
+          <a:srgbClr val="F9F0DB"/>
+        </a:solidFill>
+        <a:effectLst/>
+      </p:bgPr>
+    </p:bg>
+    <p:spTree>
+      <p:nvGrpSpPr>
+        <p:cNvPr id="1" name="">
+          <a:extLst>
+            <a:ext uri="{FF2B5EF4-FFF2-40B4-BE49-F238E27FC236}">
+              <a16:creationId xmlns:a16="http://schemas.microsoft.com/office/drawing/2014/main" id="{2D1A9071-6750-299D-C957-98AFD45BE237}"/>
+            </a:ext>
+          </a:extLst>
+        </p:cNvPr>
+        <p:cNvGrpSpPr/>
+        <p:nvPr/>
+      </p:nvGrpSpPr>
+      <p:grpSpPr>
+        <a:xfrm>
+          <a:off x="0" y="0"/>
+          <a:ext cx="0" cy="0"/>
+          <a:chOff x="0" y="0"/>
+          <a:chExt cx="0" cy="0"/>
+        </a:xfrm>
+      </p:grpSpPr>
+      <p:sp>
+        <p:nvSpPr>
+          <p:cNvPr id="10" name="TextBox 7">
+            <a:extLst>
+              <a:ext uri="{FF2B5EF4-FFF2-40B4-BE49-F238E27FC236}">
+                <a16:creationId xmlns:a16="http://schemas.microsoft.com/office/drawing/2014/main" id="{1D343F02-C4F6-0C42-4729-40ADA6063814}"/>
+              </a:ext>
+            </a:extLst>
+          </p:cNvPr>
+          <p:cNvSpPr txBox="1"/>
+          <p:nvPr/>
+        </p:nvSpPr>
+        <p:spPr>
+          <a:xfrm>
+            <a:off x="1317" y="133326"/>
+            <a:ext cx="4443563" cy="492443"/>
+          </a:xfrm>
+          <a:prstGeom prst="rect">
+            <a:avLst/>
+          </a:prstGeom>
+        </p:spPr>
+        <p:txBody>
+          <a:bodyPr wrap="square" lIns="0" tIns="0" rIns="0" bIns="0" rtlCol="0" anchor="t">
+            <a:spAutoFit/>
+          </a:bodyPr>
+          <a:lstStyle>
+            <a:defPPr>
+              <a:defRPr lang="en-US"/>
+            </a:defPPr>
+            <a:lvl1pPr marL="0" algn="l" defTabSz="1792956" rtl="0" eaLnBrk="1" latinLnBrk="0" hangingPunct="1">
+              <a:defRPr sz="3529" kern="1200">
+                <a:solidFill>
+                  <a:schemeClr val="tx1"/>
+                </a:solidFill>
+                <a:latin typeface="+mn-lt"/>
+                <a:ea typeface="+mn-ea"/>
+                <a:cs typeface="+mn-cs"/>
+              </a:defRPr>
+            </a:lvl1pPr>
+            <a:lvl2pPr marL="896478" algn="l" defTabSz="1792956" rtl="0" eaLnBrk="1" latinLnBrk="0" hangingPunct="1">
+              <a:defRPr sz="3529" kern="1200">
+                <a:solidFill>
+                  <a:schemeClr val="tx1"/>
+                </a:solidFill>
+                <a:latin typeface="+mn-lt"/>
+                <a:ea typeface="+mn-ea"/>
+                <a:cs typeface="+mn-cs"/>
+              </a:defRPr>
+            </a:lvl2pPr>
+            <a:lvl3pPr marL="1792956" algn="l" defTabSz="1792956" rtl="0" eaLnBrk="1" latinLnBrk="0" hangingPunct="1">
+              <a:defRPr sz="3529" kern="1200">
+                <a:solidFill>
+                  <a:schemeClr val="tx1"/>
+                </a:solidFill>
+                <a:latin typeface="+mn-lt"/>
+                <a:ea typeface="+mn-ea"/>
+                <a:cs typeface="+mn-cs"/>
+              </a:defRPr>
+            </a:lvl3pPr>
+            <a:lvl4pPr marL="2689433" algn="l" defTabSz="1792956" rtl="0" eaLnBrk="1" latinLnBrk="0" hangingPunct="1">
+              <a:defRPr sz="3529" kern="1200">
+                <a:solidFill>
+                  <a:schemeClr val="tx1"/>
+                </a:solidFill>
+                <a:latin typeface="+mn-lt"/>
+                <a:ea typeface="+mn-ea"/>
+                <a:cs typeface="+mn-cs"/>
+              </a:defRPr>
+            </a:lvl4pPr>
+            <a:lvl5pPr marL="3585911" algn="l" defTabSz="1792956" rtl="0" eaLnBrk="1" latinLnBrk="0" hangingPunct="1">
+              <a:defRPr sz="3529" kern="1200">
+                <a:solidFill>
+                  <a:schemeClr val="tx1"/>
+                </a:solidFill>
+                <a:latin typeface="+mn-lt"/>
+                <a:ea typeface="+mn-ea"/>
+                <a:cs typeface="+mn-cs"/>
+              </a:defRPr>
+            </a:lvl5pPr>
+            <a:lvl6pPr marL="4482389" algn="l" defTabSz="1792956" rtl="0" eaLnBrk="1" latinLnBrk="0" hangingPunct="1">
+              <a:defRPr sz="3529" kern="1200">
+                <a:solidFill>
+                  <a:schemeClr val="tx1"/>
+                </a:solidFill>
+                <a:latin typeface="+mn-lt"/>
+                <a:ea typeface="+mn-ea"/>
+                <a:cs typeface="+mn-cs"/>
+              </a:defRPr>
+            </a:lvl6pPr>
+            <a:lvl7pPr marL="5378867" algn="l" defTabSz="1792956" rtl="0" eaLnBrk="1" latinLnBrk="0" hangingPunct="1">
+              <a:defRPr sz="3529" kern="1200">
+                <a:solidFill>
+                  <a:schemeClr val="tx1"/>
+                </a:solidFill>
+                <a:latin typeface="+mn-lt"/>
+                <a:ea typeface="+mn-ea"/>
+                <a:cs typeface="+mn-cs"/>
+              </a:defRPr>
+            </a:lvl7pPr>
+            <a:lvl8pPr marL="6275344" algn="l" defTabSz="1792956" rtl="0" eaLnBrk="1" latinLnBrk="0" hangingPunct="1">
+              <a:defRPr sz="3529" kern="1200">
+                <a:solidFill>
+                  <a:schemeClr val="tx1"/>
+                </a:solidFill>
+                <a:latin typeface="+mn-lt"/>
+                <a:ea typeface="+mn-ea"/>
+                <a:cs typeface="+mn-cs"/>
+              </a:defRPr>
+            </a:lvl8pPr>
+            <a:lvl9pPr marL="7171822" algn="l" defTabSz="1792956" rtl="0" eaLnBrk="1" latinLnBrk="0" hangingPunct="1">
+              <a:defRPr sz="3529" kern="1200">
+                <a:solidFill>
+                  <a:schemeClr val="tx1"/>
+                </a:solidFill>
+                <a:latin typeface="+mn-lt"/>
+                <a:ea typeface="+mn-ea"/>
+                <a:cs typeface="+mn-cs"/>
+              </a:defRPr>
+            </a:lvl9pPr>
+          </a:lstStyle>
+          <a:p>
+            <a:pPr algn="ctr"/>
+            <a:r>
+              <a:rPr lang="en-US" sz="1600" b="1" dirty="0">
+                <a:solidFill>
+                  <a:srgbClr val="00356B"/>
+                </a:solidFill>
+                <a:latin typeface="Yale"/>
+                <a:ea typeface="Agrandir Narrow Bold"/>
+                <a:cs typeface="Agrandir Narrow Bold"/>
+                <a:sym typeface="Agrandir Narrow Bold"/>
+              </a:rPr>
+              <a:t>Yale SCHOOL OF THE ENVIRONMENT</a:t>
+            </a:r>
+          </a:p>
+          <a:p>
+            <a:r>
+              <a:rPr lang="en-US" sz="1600" b="1" i="1" dirty="0">
+                <a:solidFill>
+                  <a:srgbClr val="00356B"/>
+                </a:solidFill>
+                <a:latin typeface="Yale"/>
+                <a:ea typeface="Agrandir Narrow Bold"/>
+                <a:cs typeface="Agrandir Narrow Bold"/>
+                <a:sym typeface="Agrandir Narrow Bold"/>
+              </a:rPr>
+              <a:t>          </a:t>
+            </a:r>
+            <a:r>
+              <a:rPr lang="en-US" sz="1600" i="1" dirty="0">
+                <a:solidFill>
+                  <a:srgbClr val="00356B"/>
+                </a:solidFill>
+                <a:latin typeface="Yale"/>
+                <a:ea typeface="Agrandir Narrow Bold"/>
+                <a:cs typeface="Agrandir Narrow Bold"/>
+                <a:sym typeface="Agrandir Narrow Bold"/>
+              </a:rPr>
+              <a:t>Research Computing</a:t>
+            </a:r>
+          </a:p>
+        </p:txBody>
+      </p:sp>
+      <p:pic>
+        <p:nvPicPr>
+          <p:cNvPr id="13" name="Picture 12">
+            <a:extLst>
+              <a:ext uri="{FF2B5EF4-FFF2-40B4-BE49-F238E27FC236}">
+                <a16:creationId xmlns:a16="http://schemas.microsoft.com/office/drawing/2014/main" id="{76DA4944-758A-B8B2-1A96-82AC4036D167}"/>
+              </a:ext>
+            </a:extLst>
+          </p:cNvPr>
+          <p:cNvPicPr>
+            <a:picLocks noChangeAspect="1"/>
+          </p:cNvPicPr>
+          <p:nvPr/>
+        </p:nvPicPr>
+        <p:blipFill>
+          <a:blip r:embed="rId2">
+            <a:extLst>
+              <a:ext uri="{BEBA8EAE-BF5A-486C-A8C5-ECC9F3942E4B}">
+                <a14:imgProps xmlns:a14="http://schemas.microsoft.com/office/drawing/2010/main">
+                  <a14:imgLayer r:embed="rId3">
+                    <a14:imgEffect>
+                      <a14:backgroundRemoval t="1743" b="98039" l="1654" r="98092">
+                        <a14:foregroundMark x1="22010" y1="7734" x2="27226" y2="9695"/>
+                        <a14:foregroundMark x1="4580" y1="3050" x2="16158" y2="6100"/>
+                        <a14:foregroundMark x1="16285" y1="46950" x2="23791" y2="61765"/>
+                        <a14:foregroundMark x1="81679" y1="51961" x2="79771" y2="60240"/>
+                        <a14:foregroundMark x1="90204" y1="28214" x2="96056" y2="30065"/>
+                        <a14:foregroundMark x1="94275" y1="2614" x2="96947" y2="2941"/>
+                        <a14:foregroundMark x1="82570" y1="1743" x2="82570" y2="1743"/>
+                        <a14:foregroundMark x1="98092" y1="37255" x2="98092" y2="37255"/>
+                        <a14:foregroundMark x1="58524" y1="93682" x2="58524" y2="93682"/>
+                        <a14:foregroundMark x1="50127" y1="98148" x2="50127" y2="98148"/>
+                        <a14:foregroundMark x1="29008" y1="87691" x2="29008" y2="87691"/>
+                        <a14:foregroundMark x1="7888" y1="63508" x2="8142" y2="65251"/>
+                        <a14:foregroundMark x1="1654" y1="29085" x2="1654" y2="29085"/>
+                        <a14:foregroundMark x1="2036" y1="26580" x2="2036" y2="26580"/>
+                        <a14:foregroundMark x1="5852" y1="60022" x2="5852" y2="60022"/>
+                        <a14:foregroundMark x1="16285" y1="76144" x2="16285" y2="76144"/>
+                        <a14:foregroundMark x1="1654" y1="38562" x2="1654" y2="38562"/>
+                        <a14:foregroundMark x1="2417" y1="49564" x2="2417" y2="49564"/>
+                        <a14:foregroundMark x1="2926" y1="50000" x2="2926" y2="50000"/>
+                        <a14:foregroundMark x1="3944" y1="54031" x2="3944" y2="54031"/>
+                        <a14:foregroundMark x1="1908" y1="35839" x2="1908" y2="35839"/>
+                        <a14:foregroundMark x1="59033" y1="28214" x2="59033" y2="28214"/>
+                        <a14:foregroundMark x1="50254" y1="25817" x2="50254" y2="25817"/>
+                        <a14:foregroundMark x1="41476" y1="27451" x2="41349" y2="27560"/>
+                        <a14:foregroundMark x1="42621" y1="25708" x2="42621" y2="25708"/>
+                        <a14:foregroundMark x1="41094" y1="24619" x2="41094" y2="24619"/>
+                        <a14:foregroundMark x1="39440" y1="25817" x2="39440" y2="25817"/>
+                        <a14:foregroundMark x1="48346" y1="23203" x2="48346" y2="23203"/>
+                        <a14:foregroundMark x1="49746" y1="21895" x2="49746" y2="21895"/>
+                        <a14:foregroundMark x1="51399" y1="23094" x2="51399" y2="23094"/>
+                        <a14:foregroundMark x1="57506" y1="25599" x2="57506" y2="25599"/>
+                        <a14:foregroundMark x1="58524" y1="24510" x2="58524" y2="24510"/>
+                        <a14:foregroundMark x1="60051" y1="25272" x2="60051" y2="25272"/>
+                        <a14:foregroundMark x1="77735" y1="17538" x2="77735" y2="17538"/>
+                        <a14:foregroundMark x1="76463" y1="14924" x2="76463" y2="14924"/>
+                        <a14:foregroundMark x1="78117" y1="13834" x2="78117" y2="13834"/>
+                        <a14:foregroundMark x1="79644" y1="15033" x2="79644" y2="15033"/>
+                        <a14:foregroundMark x1="91094" y1="13834" x2="91094" y2="13834"/>
+                        <a14:foregroundMark x1="91985" y1="18192" x2="91985" y2="18192"/>
+                        <a14:foregroundMark x1="90331" y1="19390" x2="90331" y2="19390"/>
+                        <a14:foregroundMark x1="92112" y1="21242" x2="92112" y2="21242"/>
+                        <a14:foregroundMark x1="93639" y1="19390" x2="93511" y2="19390"/>
+                        <a14:foregroundMark x1="97583" y1="20044" x2="97583" y2="20044"/>
+                        <a14:foregroundMark x1="97710" y1="48475" x2="97710" y2="48475"/>
+                        <a14:foregroundMark x1="80407" y1="79194" x2="80407" y2="79194"/>
+                        <a14:foregroundMark x1="89567" y1="68519" x2="89567" y2="68519"/>
+                        <a14:foregroundMark x1="93766" y1="60566" x2="93766" y2="60566"/>
+                        <a14:foregroundMark x1="96056" y1="55338" x2="96056" y2="55338"/>
+                        <a14:foregroundMark x1="40712" y1="7298" x2="40712" y2="7298"/>
+                        <a14:foregroundMark x1="21883" y1="17538" x2="21883" y2="17538"/>
+                        <a14:foregroundMark x1="7634" y1="22004" x2="7634" y2="22004"/>
+                        <a14:foregroundMark x1="9542" y1="13399" x2="9542" y2="13399"/>
+                        <a14:foregroundMark x1="49364" y1="10022" x2="49364" y2="10022"/>
+                        <a14:foregroundMark x1="58651" y1="7190" x2="58651" y2="7190"/>
+                        <a14:foregroundMark x1="57379" y1="4575" x2="57379" y2="4575"/>
+                        <a14:foregroundMark x1="58779" y1="3486" x2="58779" y2="3486"/>
+                        <a14:foregroundMark x1="60433" y1="4684" x2="60433" y2="4684"/>
+                        <a14:foregroundMark x1="49873" y1="6209" x2="49873" y2="6209"/>
+                        <a14:foregroundMark x1="51145" y1="7081" x2="51145" y2="7081"/>
+                        <a14:foregroundMark x1="48473" y1="7081" x2="48473" y2="7081"/>
+                        <a14:foregroundMark x1="40712" y1="3268" x2="40712" y2="3268"/>
+                        <a14:foregroundMark x1="42112" y1="4575" x2="42112" y2="4575"/>
+                        <a14:foregroundMark x1="39313" y1="4575" x2="39313" y2="4575"/>
+                        <a14:foregroundMark x1="21501" y1="13943" x2="21501" y2="13943"/>
+                        <a14:foregroundMark x1="20102" y1="15142" x2="20102" y2="15142"/>
+                        <a14:foregroundMark x1="23155" y1="14815" x2="23155" y2="14815"/>
+                        <a14:foregroundMark x1="8906" y1="9586" x2="8906" y2="9586"/>
+                        <a14:foregroundMark x1="10814" y1="10784" x2="10814" y2="10784"/>
+                        <a14:foregroundMark x1="7888" y1="10675" x2="7888" y2="10675"/>
+                        <a14:foregroundMark x1="7634" y1="18301" x2="7634" y2="18301"/>
+                        <a14:foregroundMark x1="9415" y1="19499" x2="9415" y2="19499"/>
+                        <a14:foregroundMark x1="6489" y1="19390" x2="6489" y2="19390"/>
+                      </a14:backgroundRemoval>
+                    </a14:imgEffect>
+                  </a14:imgLayer>
+                </a14:imgProps>
+              </a:ext>
+            </a:extLst>
+          </a:blip>
+          <a:stretch>
+            <a:fillRect/>
+          </a:stretch>
+        </p:blipFill>
+        <p:spPr>
+          <a:xfrm>
+            <a:off x="11337235" y="41386"/>
+            <a:ext cx="764529" cy="892924"/>
+          </a:xfrm>
+          <a:prstGeom prst="rect">
+            <a:avLst/>
+          </a:prstGeom>
+        </p:spPr>
+      </p:pic>
+      <p:sp>
+        <p:nvSpPr>
+          <p:cNvPr id="2" name="TextBox 1">
+            <a:extLst>
+              <a:ext uri="{FF2B5EF4-FFF2-40B4-BE49-F238E27FC236}">
+                <a16:creationId xmlns:a16="http://schemas.microsoft.com/office/drawing/2014/main" id="{204F87BF-6C5B-BCBC-8CB3-343AFEEE1CB8}"/>
+              </a:ext>
+            </a:extLst>
+          </p:cNvPr>
+          <p:cNvSpPr txBox="1"/>
+          <p:nvPr/>
+        </p:nvSpPr>
+        <p:spPr>
+          <a:xfrm>
+            <a:off x="491240" y="1606338"/>
+            <a:ext cx="10926415" cy="369332"/>
+          </a:xfrm>
+          <a:prstGeom prst="rect">
+            <a:avLst/>
+          </a:prstGeom>
+          <a:noFill/>
+        </p:spPr>
+        <p:txBody>
+          <a:bodyPr rot="0" spcFirstLastPara="0" vertOverflow="overflow" horzOverflow="overflow" vert="horz" wrap="square" lIns="91440" tIns="45720" rIns="91440" bIns="45720" numCol="1" spcCol="0" rtlCol="0" fromWordArt="0" anchor="t" anchorCtr="0" forceAA="0" compatLnSpc="1">
+            <a:prstTxWarp prst="textNoShape">
+              <a:avLst/>
+            </a:prstTxWarp>
+            <a:spAutoFit/>
+          </a:bodyPr>
+          <a:lstStyle/>
+          <a:p>
+            <a:r>
+              <a:rPr lang="en-US" b="1" dirty="0">
+                <a:latin typeface="Microsoft Sans Serif"/>
+                <a:ea typeface="Microsoft Sans Serif"/>
+                <a:cs typeface="Microsoft Sans Serif"/>
+              </a:rPr>
+              <a:t> </a:t>
+            </a:r>
+            <a:endParaRPr lang="en-US" dirty="0">
+              <a:latin typeface="Microsoft Sans Serif"/>
+              <a:ea typeface="Microsoft Sans Serif"/>
+              <a:cs typeface="Microsoft Sans Serif"/>
+            </a:endParaRPr>
+          </a:p>
+        </p:txBody>
+      </p:sp>
+      <p:sp>
+        <p:nvSpPr>
+          <p:cNvPr id="9" name="TextBox 8">
+            <a:extLst>
+              <a:ext uri="{FF2B5EF4-FFF2-40B4-BE49-F238E27FC236}">
+                <a16:creationId xmlns:a16="http://schemas.microsoft.com/office/drawing/2014/main" id="{9FFFF1C3-8CA5-884D-A91C-8E5E22A75647}"/>
+              </a:ext>
+            </a:extLst>
+          </p:cNvPr>
+          <p:cNvSpPr txBox="1"/>
+          <p:nvPr/>
+        </p:nvSpPr>
+        <p:spPr>
+          <a:xfrm>
+            <a:off x="320068" y="1081773"/>
+            <a:ext cx="7784545" cy="523220"/>
+          </a:xfrm>
+          <a:prstGeom prst="rect">
+            <a:avLst/>
+          </a:prstGeom>
+          <a:noFill/>
+        </p:spPr>
+        <p:txBody>
+          <a:bodyPr rot="0" spcFirstLastPara="0" vertOverflow="overflow" horzOverflow="overflow" vert="horz" wrap="square" lIns="91440" tIns="45720" rIns="91440" bIns="45720" numCol="1" spcCol="0" rtlCol="0" fromWordArt="0" anchor="t" anchorCtr="0" forceAA="0" compatLnSpc="1">
+            <a:prstTxWarp prst="textNoShape">
+              <a:avLst/>
+            </a:prstTxWarp>
+            <a:spAutoFit/>
+          </a:bodyPr>
+          <a:lstStyle/>
+          <a:p>
+            <a:r>
+              <a:rPr lang="en-US" sz="2800" u="sng" dirty="0">
+                <a:latin typeface="Microsoft Sans Serif"/>
+                <a:ea typeface="Microsoft Sans Serif"/>
+                <a:cs typeface="Microsoft Sans Serif"/>
+              </a:rPr>
+              <a:t>Step 11.</a:t>
+            </a:r>
+            <a:endParaRPr lang="en-US" dirty="0"/>
+          </a:p>
+        </p:txBody>
+      </p:sp>
+      <p:pic>
+        <p:nvPicPr>
+          <p:cNvPr id="3" name="Elemento grafico 13">
+            <a:extLst>
+              <a:ext uri="{FF2B5EF4-FFF2-40B4-BE49-F238E27FC236}">
+                <a16:creationId xmlns:a16="http://schemas.microsoft.com/office/drawing/2014/main" id="{94810F23-649F-6EEA-4AD2-C5B68E6A1750}"/>
+              </a:ext>
+            </a:extLst>
+          </p:cNvPr>
+          <p:cNvPicPr>
+            <a:picLocks noChangeAspect="1"/>
+          </p:cNvPicPr>
+          <p:nvPr/>
+        </p:nvPicPr>
+        <p:blipFill>
+          <a:blip r:embed="rId4">
+            <a:extLst>
+              <a:ext uri="{96DAC541-7B7A-43D3-8B79-37D633B846F1}">
+                <asvg:svgBlip xmlns:asvg="http://schemas.microsoft.com/office/drawing/2016/SVG/main" r:embed="rId5"/>
+              </a:ext>
+            </a:extLst>
+          </a:blip>
+          <a:stretch>
+            <a:fillRect/>
+          </a:stretch>
+        </p:blipFill>
+        <p:spPr>
+          <a:xfrm>
+            <a:off x="2099530" y="1294888"/>
+            <a:ext cx="8935053" cy="5025967"/>
+          </a:xfrm>
+          <a:prstGeom prst="rect">
+            <a:avLst/>
+          </a:prstGeom>
+        </p:spPr>
+      </p:pic>
+    </p:spTree>
+    <p:extLst>
+      <p:ext uri="{BB962C8B-B14F-4D97-AF65-F5344CB8AC3E}">
+        <p14:creationId xmlns:p14="http://schemas.microsoft.com/office/powerpoint/2010/main" val="1734176614"/>
+      </p:ext>
+    </p:extLst>
+  </p:cSld>
+  <p:clrMapOvr>
+    <a:masterClrMapping/>
+  </p:clrMapOvr>
+</p:sld>
+</file>
+
 <file path=ppt/slides/slide2.xml><?xml version="1.0" encoding="utf-8"?>
 <p:sld xmlns:a="http://schemas.openxmlformats.org/drawingml/2006/main" xmlns:r="http://schemas.openxmlformats.org/officeDocument/2006/relationships" xmlns:p="http://schemas.openxmlformats.org/presentationml/2006/main">
   <p:cSld>
@@ -6457,7 +7342,7 @@
               </a:rPr>
               <a:t>Open your terminal, RStudio, IDE</a:t>
             </a:r>
-            <a:endParaRPr lang="en-US" sz="2400">
+            <a:endParaRPr lang="en-US" sz="2400" dirty="0">
               <a:latin typeface="Aptos" panose="020B0004020202020204"/>
               <a:ea typeface="Microsoft Sans Serif"/>
               <a:cs typeface="Microsoft Sans Serif"/>
@@ -6540,14 +7425,6 @@
               </a:rPr>
               <a:t>https://github.com/mitchellxh/test-page.git</a:t>
             </a:r>
-            <a:endParaRPr lang="en-US" sz="2400" b="1">
-              <a:highlight>
-                <a:srgbClr val="F5F5F5"/>
-              </a:highlight>
-              <a:latin typeface="Consolas"/>
-              <a:ea typeface="Microsoft Sans Serif"/>
-              <a:cs typeface="Microsoft Sans Serif"/>
-            </a:endParaRPr>
           </a:p>
         </p:txBody>
       </p:sp>
@@ -7068,7 +7945,7 @@
               </a:rPr>
               <a:t>Open your file browser and open the file:</a:t>
             </a:r>
-            <a:endParaRPr lang="en-US" sz="2400">
+            <a:endParaRPr lang="en-US" sz="2400" dirty="0">
               <a:latin typeface="Aptos" panose="020B0004020202020204"/>
               <a:ea typeface="Microsoft Sans Serif"/>
               <a:cs typeface="Microsoft Sans Serif"/>
@@ -7095,7 +7972,7 @@
               </a:rPr>
               <a:t>instructions.md</a:t>
             </a:r>
-            <a:endParaRPr lang="en-US"/>
+            <a:endParaRPr lang="en-US" dirty="0"/>
           </a:p>
           <a:p>
             <a:pPr marL="914400" lvl="1" indent="-457200">

</xml_diff>